<commit_message>
angualar testing with jasmine and karma for running capstone project done
</commit_message>
<xml_diff>
--- a/Phase 2/Step 10 - testing jasmine and karma.pptx
+++ b/Phase 2/Step 10 - testing jasmine and karma.pptx
@@ -22,6 +22,14 @@
     <p:sldId id="291" r:id="rId16"/>
     <p:sldId id="292" r:id="rId17"/>
     <p:sldId id="293" r:id="rId18"/>
+    <p:sldId id="294" r:id="rId19"/>
+    <p:sldId id="295" r:id="rId20"/>
+    <p:sldId id="296" r:id="rId21"/>
+    <p:sldId id="297" r:id="rId22"/>
+    <p:sldId id="298" r:id="rId23"/>
+    <p:sldId id="299" r:id="rId24"/>
+    <p:sldId id="300" r:id="rId25"/>
+    <p:sldId id="301" r:id="rId26"/>
   </p:sldIdLst>
   <p:sldSz cx="12192000" cy="6858000"/>
   <p:notesSz cx="6858000" cy="9144000"/>
@@ -259,7 +267,7 @@
           <a:p>
             <a:fld id="{42386099-759E-47AF-B5BA-C91AC6CEC5A3}" type="datetimeFigureOut">
               <a:rPr lang="en-US" smtClean="0"/>
-              <a:t>1/5/2023</a:t>
+              <a:t>1/6/2023</a:t>
             </a:fld>
             <a:endParaRPr lang="en-US"/>
           </a:p>
@@ -429,7 +437,7 @@
           <a:p>
             <a:fld id="{42386099-759E-47AF-B5BA-C91AC6CEC5A3}" type="datetimeFigureOut">
               <a:rPr lang="en-US" smtClean="0"/>
-              <a:t>1/5/2023</a:t>
+              <a:t>1/6/2023</a:t>
             </a:fld>
             <a:endParaRPr lang="en-US"/>
           </a:p>
@@ -609,7 +617,7 @@
           <a:p>
             <a:fld id="{42386099-759E-47AF-B5BA-C91AC6CEC5A3}" type="datetimeFigureOut">
               <a:rPr lang="en-US" smtClean="0"/>
-              <a:t>1/5/2023</a:t>
+              <a:t>1/6/2023</a:t>
             </a:fld>
             <a:endParaRPr lang="en-US"/>
           </a:p>
@@ -779,7 +787,7 @@
           <a:p>
             <a:fld id="{42386099-759E-47AF-B5BA-C91AC6CEC5A3}" type="datetimeFigureOut">
               <a:rPr lang="en-US" smtClean="0"/>
-              <a:t>1/5/2023</a:t>
+              <a:t>1/6/2023</a:t>
             </a:fld>
             <a:endParaRPr lang="en-US"/>
           </a:p>
@@ -1025,7 +1033,7 @@
           <a:p>
             <a:fld id="{42386099-759E-47AF-B5BA-C91AC6CEC5A3}" type="datetimeFigureOut">
               <a:rPr lang="en-US" smtClean="0"/>
-              <a:t>1/5/2023</a:t>
+              <a:t>1/6/2023</a:t>
             </a:fld>
             <a:endParaRPr lang="en-US"/>
           </a:p>
@@ -1257,7 +1265,7 @@
           <a:p>
             <a:fld id="{42386099-759E-47AF-B5BA-C91AC6CEC5A3}" type="datetimeFigureOut">
               <a:rPr lang="en-US" smtClean="0"/>
-              <a:t>1/5/2023</a:t>
+              <a:t>1/6/2023</a:t>
             </a:fld>
             <a:endParaRPr lang="en-US"/>
           </a:p>
@@ -1624,7 +1632,7 @@
           <a:p>
             <a:fld id="{42386099-759E-47AF-B5BA-C91AC6CEC5A3}" type="datetimeFigureOut">
               <a:rPr lang="en-US" smtClean="0"/>
-              <a:t>1/5/2023</a:t>
+              <a:t>1/6/2023</a:t>
             </a:fld>
             <a:endParaRPr lang="en-US"/>
           </a:p>
@@ -1742,7 +1750,7 @@
           <a:p>
             <a:fld id="{42386099-759E-47AF-B5BA-C91AC6CEC5A3}" type="datetimeFigureOut">
               <a:rPr lang="en-US" smtClean="0"/>
-              <a:t>1/5/2023</a:t>
+              <a:t>1/6/2023</a:t>
             </a:fld>
             <a:endParaRPr lang="en-US"/>
           </a:p>
@@ -1837,7 +1845,7 @@
           <a:p>
             <a:fld id="{42386099-759E-47AF-B5BA-C91AC6CEC5A3}" type="datetimeFigureOut">
               <a:rPr lang="en-US" smtClean="0"/>
-              <a:t>1/5/2023</a:t>
+              <a:t>1/6/2023</a:t>
             </a:fld>
             <a:endParaRPr lang="en-US"/>
           </a:p>
@@ -2114,7 +2122,7 @@
           <a:p>
             <a:fld id="{42386099-759E-47AF-B5BA-C91AC6CEC5A3}" type="datetimeFigureOut">
               <a:rPr lang="en-US" smtClean="0"/>
-              <a:t>1/5/2023</a:t>
+              <a:t>1/6/2023</a:t>
             </a:fld>
             <a:endParaRPr lang="en-US"/>
           </a:p>
@@ -2367,7 +2375,7 @@
           <a:p>
             <a:fld id="{42386099-759E-47AF-B5BA-C91AC6CEC5A3}" type="datetimeFigureOut">
               <a:rPr lang="en-US" smtClean="0"/>
-              <a:t>1/5/2023</a:t>
+              <a:t>1/6/2023</a:t>
             </a:fld>
             <a:endParaRPr lang="en-US"/>
           </a:p>
@@ -2580,7 +2588,7 @@
           <a:p>
             <a:fld id="{42386099-759E-47AF-B5BA-C91AC6CEC5A3}" type="datetimeFigureOut">
               <a:rPr lang="en-US" smtClean="0"/>
-              <a:t>1/5/2023</a:t>
+              <a:t>1/6/2023</a:t>
             </a:fld>
             <a:endParaRPr lang="en-US"/>
           </a:p>
@@ -3002,15 +3010,7 @@
           <a:p>
             <a:r>
               <a:rPr lang="en-US" dirty="0" smtClean="0"/>
-              <a:t>Testing using Jasmine and Karma </a:t>
-            </a:r>
-            <a:r>
-              <a:rPr lang="en-US" dirty="0" smtClean="0"/>
-              <a:t>– Step </a:t>
-            </a:r>
-            <a:r>
-              <a:rPr lang="en-US" dirty="0" smtClean="0"/>
-              <a:t>10</a:t>
+              <a:t>Testing using Jasmine and Karma – Step 10</a:t>
             </a:r>
             <a:endParaRPr lang="en-US" dirty="0"/>
           </a:p>
@@ -3709,6 +3709,168 @@
 </p:sld>
 </file>
 
+<file path=ppt/slides/slide18.xml><?xml version="1.0" encoding="utf-8"?>
+<p:sld xmlns:a="http://schemas.openxmlformats.org/drawingml/2006/main" xmlns:r="http://schemas.openxmlformats.org/officeDocument/2006/relationships" xmlns:p="http://schemas.openxmlformats.org/presentationml/2006/main">
+  <p:cSld>
+    <p:spTree>
+      <p:nvGrpSpPr>
+        <p:cNvPr id="1" name=""/>
+        <p:cNvGrpSpPr/>
+        <p:nvPr/>
+      </p:nvGrpSpPr>
+      <p:grpSpPr>
+        <a:xfrm>
+          <a:off x="0" y="0"/>
+          <a:ext cx="0" cy="0"/>
+          <a:chOff x="0" y="0"/>
+          <a:chExt cx="0" cy="0"/>
+        </a:xfrm>
+      </p:grpSpPr>
+      <p:sp>
+        <p:nvSpPr>
+          <p:cNvPr id="2" name="Title 1"/>
+          <p:cNvSpPr>
+            <a:spLocks noGrp="1"/>
+          </p:cNvSpPr>
+          <p:nvPr>
+            <p:ph type="title"/>
+          </p:nvPr>
+        </p:nvSpPr>
+        <p:spPr/>
+        <p:txBody>
+          <a:bodyPr/>
+          <a:lstStyle/>
+          <a:p>
+            <a:r>
+              <a:rPr lang="en-US" dirty="0" smtClean="0"/>
+              <a:t>Testing in banking application </a:t>
+            </a:r>
+            <a:endParaRPr lang="en-US" dirty="0"/>
+          </a:p>
+        </p:txBody>
+      </p:sp>
+      <p:pic>
+        <p:nvPicPr>
+          <p:cNvPr id="4" name="Content Placeholder 3"/>
+          <p:cNvPicPr>
+            <a:picLocks noGrp="1" noChangeAspect="1"/>
+          </p:cNvPicPr>
+          <p:nvPr>
+            <p:ph idx="1"/>
+          </p:nvPr>
+        </p:nvPicPr>
+        <p:blipFill>
+          <a:blip r:embed="rId2"/>
+          <a:stretch>
+            <a:fillRect/>
+          </a:stretch>
+        </p:blipFill>
+        <p:spPr>
+          <a:xfrm>
+            <a:off x="838200" y="3255764"/>
+            <a:ext cx="10515600" cy="1491059"/>
+          </a:xfrm>
+          <a:prstGeom prst="rect">
+            <a:avLst/>
+          </a:prstGeom>
+        </p:spPr>
+      </p:pic>
+    </p:spTree>
+    <p:extLst>
+      <p:ext uri="{BB962C8B-B14F-4D97-AF65-F5344CB8AC3E}">
+        <p14:creationId xmlns:p14="http://schemas.microsoft.com/office/powerpoint/2010/main" val="1199391653"/>
+      </p:ext>
+    </p:extLst>
+  </p:cSld>
+  <p:clrMapOvr>
+    <a:masterClrMapping/>
+  </p:clrMapOvr>
+</p:sld>
+</file>
+
+<file path=ppt/slides/slide19.xml><?xml version="1.0" encoding="utf-8"?>
+<p:sld xmlns:a="http://schemas.openxmlformats.org/drawingml/2006/main" xmlns:r="http://schemas.openxmlformats.org/officeDocument/2006/relationships" xmlns:p="http://schemas.openxmlformats.org/presentationml/2006/main">
+  <p:cSld>
+    <p:spTree>
+      <p:nvGrpSpPr>
+        <p:cNvPr id="1" name=""/>
+        <p:cNvGrpSpPr/>
+        <p:nvPr/>
+      </p:nvGrpSpPr>
+      <p:grpSpPr>
+        <a:xfrm>
+          <a:off x="0" y="0"/>
+          <a:ext cx="0" cy="0"/>
+          <a:chOff x="0" y="0"/>
+          <a:chExt cx="0" cy="0"/>
+        </a:xfrm>
+      </p:grpSpPr>
+      <p:sp>
+        <p:nvSpPr>
+          <p:cNvPr id="2" name="Title 1"/>
+          <p:cNvSpPr>
+            <a:spLocks noGrp="1"/>
+          </p:cNvSpPr>
+          <p:nvPr>
+            <p:ph type="title"/>
+          </p:nvPr>
+        </p:nvSpPr>
+        <p:spPr/>
+        <p:txBody>
+          <a:bodyPr/>
+          <a:lstStyle/>
+          <a:p>
+            <a:r>
+              <a:rPr lang="en-US" dirty="0" err="1"/>
+              <a:t>a</a:t>
+            </a:r>
+            <a:r>
+              <a:rPr lang="en-US" dirty="0" err="1" smtClean="0"/>
+              <a:t>pp.component.spec.ts</a:t>
+            </a:r>
+            <a:endParaRPr lang="en-US" dirty="0"/>
+          </a:p>
+        </p:txBody>
+      </p:sp>
+      <p:pic>
+        <p:nvPicPr>
+          <p:cNvPr id="4" name="Content Placeholder 3"/>
+          <p:cNvPicPr>
+            <a:picLocks noGrp="1" noChangeAspect="1"/>
+          </p:cNvPicPr>
+          <p:nvPr>
+            <p:ph idx="1"/>
+          </p:nvPr>
+        </p:nvPicPr>
+        <p:blipFill>
+          <a:blip r:embed="rId2"/>
+          <a:stretch>
+            <a:fillRect/>
+          </a:stretch>
+        </p:blipFill>
+        <p:spPr>
+          <a:xfrm>
+            <a:off x="2161070" y="1825625"/>
+            <a:ext cx="7869860" cy="4351338"/>
+          </a:xfrm>
+          <a:prstGeom prst="rect">
+            <a:avLst/>
+          </a:prstGeom>
+        </p:spPr>
+      </p:pic>
+    </p:spTree>
+    <p:extLst>
+      <p:ext uri="{BB962C8B-B14F-4D97-AF65-F5344CB8AC3E}">
+        <p14:creationId xmlns:p14="http://schemas.microsoft.com/office/powerpoint/2010/main" val="813623825"/>
+      </p:ext>
+    </p:extLst>
+  </p:cSld>
+  <p:clrMapOvr>
+    <a:masterClrMapping/>
+  </p:clrMapOvr>
+</p:sld>
+</file>
+
 <file path=ppt/slides/slide2.xml><?xml version="1.0" encoding="utf-8"?>
 <p:sld xmlns:a="http://schemas.openxmlformats.org/drawingml/2006/main" xmlns:r="http://schemas.openxmlformats.org/officeDocument/2006/relationships" xmlns:p="http://schemas.openxmlformats.org/presentationml/2006/main">
   <p:cSld>
@@ -3827,6 +3989,463 @@
     <p:extLst>
       <p:ext uri="{BB962C8B-B14F-4D97-AF65-F5344CB8AC3E}">
         <p14:creationId xmlns:p14="http://schemas.microsoft.com/office/powerpoint/2010/main" val="965558226"/>
+      </p:ext>
+    </p:extLst>
+  </p:cSld>
+  <p:clrMapOvr>
+    <a:masterClrMapping/>
+  </p:clrMapOvr>
+</p:sld>
+</file>
+
+<file path=ppt/slides/slide20.xml><?xml version="1.0" encoding="utf-8"?>
+<p:sld xmlns:a="http://schemas.openxmlformats.org/drawingml/2006/main" xmlns:r="http://schemas.openxmlformats.org/officeDocument/2006/relationships" xmlns:p="http://schemas.openxmlformats.org/presentationml/2006/main">
+  <p:cSld>
+    <p:spTree>
+      <p:nvGrpSpPr>
+        <p:cNvPr id="1" name=""/>
+        <p:cNvGrpSpPr/>
+        <p:nvPr/>
+      </p:nvGrpSpPr>
+      <p:grpSpPr>
+        <a:xfrm>
+          <a:off x="0" y="0"/>
+          <a:ext cx="0" cy="0"/>
+          <a:chOff x="0" y="0"/>
+          <a:chExt cx="0" cy="0"/>
+        </a:xfrm>
+      </p:grpSpPr>
+      <p:sp>
+        <p:nvSpPr>
+          <p:cNvPr id="2" name="Title 1"/>
+          <p:cNvSpPr>
+            <a:spLocks noGrp="1"/>
+          </p:cNvSpPr>
+          <p:nvPr>
+            <p:ph type="title"/>
+          </p:nvPr>
+        </p:nvSpPr>
+        <p:spPr/>
+        <p:txBody>
+          <a:bodyPr/>
+          <a:lstStyle/>
+          <a:p>
+            <a:r>
+              <a:rPr lang="en-US" dirty="0" err="1" smtClean="0"/>
+              <a:t>Home.component.spec.ts</a:t>
+            </a:r>
+            <a:endParaRPr lang="en-US" dirty="0"/>
+          </a:p>
+        </p:txBody>
+      </p:sp>
+      <p:pic>
+        <p:nvPicPr>
+          <p:cNvPr id="4" name="Content Placeholder 3"/>
+          <p:cNvPicPr>
+            <a:picLocks noGrp="1" noChangeAspect="1"/>
+          </p:cNvPicPr>
+          <p:nvPr>
+            <p:ph idx="1"/>
+          </p:nvPr>
+        </p:nvPicPr>
+        <p:blipFill>
+          <a:blip r:embed="rId2"/>
+          <a:stretch>
+            <a:fillRect/>
+          </a:stretch>
+        </p:blipFill>
+        <p:spPr>
+          <a:xfrm>
+            <a:off x="1915574" y="1825625"/>
+            <a:ext cx="8360851" cy="4351338"/>
+          </a:xfrm>
+          <a:prstGeom prst="rect">
+            <a:avLst/>
+          </a:prstGeom>
+        </p:spPr>
+      </p:pic>
+    </p:spTree>
+    <p:extLst>
+      <p:ext uri="{BB962C8B-B14F-4D97-AF65-F5344CB8AC3E}">
+        <p14:creationId xmlns:p14="http://schemas.microsoft.com/office/powerpoint/2010/main" val="3531282331"/>
+      </p:ext>
+    </p:extLst>
+  </p:cSld>
+  <p:clrMapOvr>
+    <a:masterClrMapping/>
+  </p:clrMapOvr>
+</p:sld>
+</file>
+
+<file path=ppt/slides/slide21.xml><?xml version="1.0" encoding="utf-8"?>
+<p:sld xmlns:a="http://schemas.openxmlformats.org/drawingml/2006/main" xmlns:r="http://schemas.openxmlformats.org/officeDocument/2006/relationships" xmlns:p="http://schemas.openxmlformats.org/presentationml/2006/main">
+  <p:cSld>
+    <p:spTree>
+      <p:nvGrpSpPr>
+        <p:cNvPr id="1" name=""/>
+        <p:cNvGrpSpPr/>
+        <p:nvPr/>
+      </p:nvGrpSpPr>
+      <p:grpSpPr>
+        <a:xfrm>
+          <a:off x="0" y="0"/>
+          <a:ext cx="0" cy="0"/>
+          <a:chOff x="0" y="0"/>
+          <a:chExt cx="0" cy="0"/>
+        </a:xfrm>
+      </p:grpSpPr>
+      <p:sp>
+        <p:nvSpPr>
+          <p:cNvPr id="2" name="Title 1"/>
+          <p:cNvSpPr>
+            <a:spLocks noGrp="1"/>
+          </p:cNvSpPr>
+          <p:nvPr>
+            <p:ph type="title"/>
+          </p:nvPr>
+        </p:nvSpPr>
+        <p:spPr/>
+        <p:txBody>
+          <a:bodyPr/>
+          <a:lstStyle/>
+          <a:p>
+            <a:r>
+              <a:rPr lang="en-US" dirty="0" smtClean="0"/>
+              <a:t>Customer-</a:t>
+            </a:r>
+            <a:r>
+              <a:rPr lang="en-US" dirty="0" err="1" smtClean="0"/>
+              <a:t>home.component.spec.ts</a:t>
+            </a:r>
+            <a:endParaRPr lang="en-US" dirty="0"/>
+          </a:p>
+        </p:txBody>
+      </p:sp>
+      <p:pic>
+        <p:nvPicPr>
+          <p:cNvPr id="4" name="Content Placeholder 3"/>
+          <p:cNvPicPr>
+            <a:picLocks noGrp="1" noChangeAspect="1"/>
+          </p:cNvPicPr>
+          <p:nvPr>
+            <p:ph idx="1"/>
+          </p:nvPr>
+        </p:nvPicPr>
+        <p:blipFill>
+          <a:blip r:embed="rId2"/>
+          <a:stretch>
+            <a:fillRect/>
+          </a:stretch>
+        </p:blipFill>
+        <p:spPr>
+          <a:xfrm>
+            <a:off x="1807030" y="1825625"/>
+            <a:ext cx="8577940" cy="4351338"/>
+          </a:xfrm>
+          <a:prstGeom prst="rect">
+            <a:avLst/>
+          </a:prstGeom>
+        </p:spPr>
+      </p:pic>
+    </p:spTree>
+    <p:extLst>
+      <p:ext uri="{BB962C8B-B14F-4D97-AF65-F5344CB8AC3E}">
+        <p14:creationId xmlns:p14="http://schemas.microsoft.com/office/powerpoint/2010/main" val="1099499755"/>
+      </p:ext>
+    </p:extLst>
+  </p:cSld>
+  <p:clrMapOvr>
+    <a:masterClrMapping/>
+  </p:clrMapOvr>
+</p:sld>
+</file>
+
+<file path=ppt/slides/slide22.xml><?xml version="1.0" encoding="utf-8"?>
+<p:sld xmlns:a="http://schemas.openxmlformats.org/drawingml/2006/main" xmlns:r="http://schemas.openxmlformats.org/officeDocument/2006/relationships" xmlns:p="http://schemas.openxmlformats.org/presentationml/2006/main">
+  <p:cSld>
+    <p:spTree>
+      <p:nvGrpSpPr>
+        <p:cNvPr id="1" name=""/>
+        <p:cNvGrpSpPr/>
+        <p:nvPr/>
+      </p:nvGrpSpPr>
+      <p:grpSpPr>
+        <a:xfrm>
+          <a:off x="0" y="0"/>
+          <a:ext cx="0" cy="0"/>
+          <a:chOff x="0" y="0"/>
+          <a:chExt cx="0" cy="0"/>
+        </a:xfrm>
+      </p:grpSpPr>
+      <p:sp>
+        <p:nvSpPr>
+          <p:cNvPr id="2" name="Title 1"/>
+          <p:cNvSpPr>
+            <a:spLocks noGrp="1"/>
+          </p:cNvSpPr>
+          <p:nvPr>
+            <p:ph type="title"/>
+          </p:nvPr>
+        </p:nvSpPr>
+        <p:spPr/>
+        <p:txBody>
+          <a:bodyPr/>
+          <a:lstStyle/>
+          <a:p>
+            <a:r>
+              <a:rPr lang="en-US" dirty="0" smtClean="0"/>
+              <a:t>Admin-</a:t>
+            </a:r>
+            <a:r>
+              <a:rPr lang="en-US" dirty="0" err="1" smtClean="0"/>
+              <a:t>home.component.spec.ts</a:t>
+            </a:r>
+            <a:endParaRPr lang="en-US" dirty="0"/>
+          </a:p>
+        </p:txBody>
+      </p:sp>
+      <p:pic>
+        <p:nvPicPr>
+          <p:cNvPr id="4" name="Content Placeholder 3"/>
+          <p:cNvPicPr>
+            <a:picLocks noGrp="1" noChangeAspect="1"/>
+          </p:cNvPicPr>
+          <p:nvPr>
+            <p:ph idx="1"/>
+          </p:nvPr>
+        </p:nvPicPr>
+        <p:blipFill>
+          <a:blip r:embed="rId2"/>
+          <a:stretch>
+            <a:fillRect/>
+          </a:stretch>
+        </p:blipFill>
+        <p:spPr>
+          <a:xfrm>
+            <a:off x="1890354" y="1825625"/>
+            <a:ext cx="8411291" cy="4351338"/>
+          </a:xfrm>
+          <a:prstGeom prst="rect">
+            <a:avLst/>
+          </a:prstGeom>
+        </p:spPr>
+      </p:pic>
+    </p:spTree>
+    <p:extLst>
+      <p:ext uri="{BB962C8B-B14F-4D97-AF65-F5344CB8AC3E}">
+        <p14:creationId xmlns:p14="http://schemas.microsoft.com/office/powerpoint/2010/main" val="2990441641"/>
+      </p:ext>
+    </p:extLst>
+  </p:cSld>
+  <p:clrMapOvr>
+    <a:masterClrMapping/>
+  </p:clrMapOvr>
+</p:sld>
+</file>
+
+<file path=ppt/slides/slide23.xml><?xml version="1.0" encoding="utf-8"?>
+<p:sld xmlns:a="http://schemas.openxmlformats.org/drawingml/2006/main" xmlns:r="http://schemas.openxmlformats.org/officeDocument/2006/relationships" xmlns:p="http://schemas.openxmlformats.org/presentationml/2006/main">
+  <p:cSld>
+    <p:spTree>
+      <p:nvGrpSpPr>
+        <p:cNvPr id="1" name=""/>
+        <p:cNvGrpSpPr/>
+        <p:nvPr/>
+      </p:nvGrpSpPr>
+      <p:grpSpPr>
+        <a:xfrm>
+          <a:off x="0" y="0"/>
+          <a:ext cx="0" cy="0"/>
+          <a:chOff x="0" y="0"/>
+          <a:chExt cx="0" cy="0"/>
+        </a:xfrm>
+      </p:grpSpPr>
+      <p:sp>
+        <p:nvSpPr>
+          <p:cNvPr id="2" name="Title 1"/>
+          <p:cNvSpPr>
+            <a:spLocks noGrp="1"/>
+          </p:cNvSpPr>
+          <p:nvPr>
+            <p:ph type="title"/>
+          </p:nvPr>
+        </p:nvSpPr>
+        <p:spPr/>
+        <p:txBody>
+          <a:bodyPr/>
+          <a:lstStyle/>
+          <a:p>
+            <a:r>
+              <a:rPr lang="en-US" dirty="0" err="1" smtClean="0"/>
+              <a:t>Customer.service.spec.ts</a:t>
+            </a:r>
+            <a:endParaRPr lang="en-US" dirty="0"/>
+          </a:p>
+        </p:txBody>
+      </p:sp>
+      <p:pic>
+        <p:nvPicPr>
+          <p:cNvPr id="4" name="Content Placeholder 3"/>
+          <p:cNvPicPr>
+            <a:picLocks noGrp="1" noChangeAspect="1"/>
+          </p:cNvPicPr>
+          <p:nvPr>
+            <p:ph idx="1"/>
+          </p:nvPr>
+        </p:nvPicPr>
+        <p:blipFill>
+          <a:blip r:embed="rId2"/>
+          <a:stretch>
+            <a:fillRect/>
+          </a:stretch>
+        </p:blipFill>
+        <p:spPr>
+          <a:xfrm>
+            <a:off x="1756538" y="1825625"/>
+            <a:ext cx="8678924" cy="4351338"/>
+          </a:xfrm>
+          <a:prstGeom prst="rect">
+            <a:avLst/>
+          </a:prstGeom>
+        </p:spPr>
+      </p:pic>
+    </p:spTree>
+    <p:extLst>
+      <p:ext uri="{BB962C8B-B14F-4D97-AF65-F5344CB8AC3E}">
+        <p14:creationId xmlns:p14="http://schemas.microsoft.com/office/powerpoint/2010/main" val="2704202823"/>
+      </p:ext>
+    </p:extLst>
+  </p:cSld>
+  <p:clrMapOvr>
+    <a:masterClrMapping/>
+  </p:clrMapOvr>
+</p:sld>
+</file>
+
+<file path=ppt/slides/slide24.xml><?xml version="1.0" encoding="utf-8"?>
+<p:sld xmlns:a="http://schemas.openxmlformats.org/drawingml/2006/main" xmlns:r="http://schemas.openxmlformats.org/officeDocument/2006/relationships" xmlns:p="http://schemas.openxmlformats.org/presentationml/2006/main">
+  <p:cSld>
+    <p:spTree>
+      <p:nvGrpSpPr>
+        <p:cNvPr id="1" name=""/>
+        <p:cNvGrpSpPr/>
+        <p:nvPr/>
+      </p:nvGrpSpPr>
+      <p:grpSpPr>
+        <a:xfrm>
+          <a:off x="0" y="0"/>
+          <a:ext cx="0" cy="0"/>
+          <a:chOff x="0" y="0"/>
+          <a:chExt cx="0" cy="0"/>
+        </a:xfrm>
+      </p:grpSpPr>
+      <p:sp>
+        <p:nvSpPr>
+          <p:cNvPr id="2" name="Title 1"/>
+          <p:cNvSpPr>
+            <a:spLocks noGrp="1"/>
+          </p:cNvSpPr>
+          <p:nvPr>
+            <p:ph type="title"/>
+          </p:nvPr>
+        </p:nvSpPr>
+        <p:spPr/>
+        <p:txBody>
+          <a:bodyPr/>
+          <a:lstStyle/>
+          <a:p>
+            <a:r>
+              <a:rPr lang="en-US" dirty="0" err="1" smtClean="0"/>
+              <a:t>Transaction.service.spec.ts</a:t>
+            </a:r>
+            <a:endParaRPr lang="en-US" dirty="0"/>
+          </a:p>
+        </p:txBody>
+      </p:sp>
+      <p:pic>
+        <p:nvPicPr>
+          <p:cNvPr id="4" name="Content Placeholder 3"/>
+          <p:cNvPicPr>
+            <a:picLocks noGrp="1" noChangeAspect="1"/>
+          </p:cNvPicPr>
+          <p:nvPr>
+            <p:ph idx="1"/>
+          </p:nvPr>
+        </p:nvPicPr>
+        <p:blipFill>
+          <a:blip r:embed="rId2"/>
+          <a:stretch>
+            <a:fillRect/>
+          </a:stretch>
+        </p:blipFill>
+        <p:spPr>
+          <a:xfrm>
+            <a:off x="1754331" y="1825625"/>
+            <a:ext cx="8683337" cy="4351338"/>
+          </a:xfrm>
+          <a:prstGeom prst="rect">
+            <a:avLst/>
+          </a:prstGeom>
+        </p:spPr>
+      </p:pic>
+    </p:spTree>
+    <p:extLst>
+      <p:ext uri="{BB962C8B-B14F-4D97-AF65-F5344CB8AC3E}">
+        <p14:creationId xmlns:p14="http://schemas.microsoft.com/office/powerpoint/2010/main" val="3571270620"/>
+      </p:ext>
+    </p:extLst>
+  </p:cSld>
+  <p:clrMapOvr>
+    <a:masterClrMapping/>
+  </p:clrMapOvr>
+</p:sld>
+</file>
+
+<file path=ppt/slides/slide25.xml><?xml version="1.0" encoding="utf-8"?>
+<p:sld xmlns:a="http://schemas.openxmlformats.org/drawingml/2006/main" xmlns:r="http://schemas.openxmlformats.org/officeDocument/2006/relationships" xmlns:p="http://schemas.openxmlformats.org/presentationml/2006/main">
+  <p:cSld>
+    <p:spTree>
+      <p:nvGrpSpPr>
+        <p:cNvPr id="1" name=""/>
+        <p:cNvGrpSpPr/>
+        <p:nvPr/>
+      </p:nvGrpSpPr>
+      <p:grpSpPr>
+        <a:xfrm>
+          <a:off x="0" y="0"/>
+          <a:ext cx="0" cy="0"/>
+          <a:chOff x="0" y="0"/>
+          <a:chExt cx="0" cy="0"/>
+        </a:xfrm>
+      </p:grpSpPr>
+      <p:pic>
+        <p:nvPicPr>
+          <p:cNvPr id="2" name="Picture 1"/>
+          <p:cNvPicPr>
+            <a:picLocks noChangeAspect="1"/>
+          </p:cNvPicPr>
+          <p:nvPr/>
+        </p:nvPicPr>
+        <p:blipFill>
+          <a:blip r:embed="rId2"/>
+          <a:stretch>
+            <a:fillRect/>
+          </a:stretch>
+        </p:blipFill>
+        <p:spPr>
+          <a:xfrm>
+            <a:off x="0" y="-443347"/>
+            <a:ext cx="12192000" cy="7253897"/>
+          </a:xfrm>
+          <a:prstGeom prst="rect">
+            <a:avLst/>
+          </a:prstGeom>
+        </p:spPr>
+      </p:pic>
+    </p:spTree>
+    <p:extLst>
+      <p:ext uri="{BB962C8B-B14F-4D97-AF65-F5344CB8AC3E}">
+        <p14:creationId xmlns:p14="http://schemas.microsoft.com/office/powerpoint/2010/main" val="4080667158"/>
       </p:ext>
     </p:extLst>
   </p:cSld>
@@ -3913,7 +4532,6 @@
               <a:rPr lang="en-US" dirty="0"/>
               <a:t> is a type of software testing where individual units or components of a software are tested.</a:t>
             </a:r>
-            <a:endParaRPr lang="en-US" dirty="0"/>
           </a:p>
         </p:txBody>
       </p:sp>

</xml_diff>